<commit_message>
updated- added support to forgine currency (INR,USD,EUR,HKD)
</commit_message>
<xml_diff>
--- a/Major Project final presentaion.pptx
+++ b/Major Project final presentaion.pptx
@@ -221,7 +221,7 @@
           <a:p>
             <a:fld id="{06C1C12A-5C59-4418-AF79-1B81554AA351}" type="datetimeFigureOut">
               <a:rPr lang="en-IN" smtClean="0"/>
-              <a:t>14-06-2022</a:t>
+              <a:t>15-06-2022</a:t>
             </a:fld>
             <a:endParaRPr lang="en-IN"/>
           </a:p>
@@ -435,7 +435,7 @@
           <a:p>
             <a:fld id="{E695A440-134A-41B0-A0D1-8FBBAB98E21C}" type="datetimeFigureOut">
               <a:rPr lang="en-IN" smtClean="0"/>
-              <a:t>14-06-2022</a:t>
+              <a:t>15-06-2022</a:t>
             </a:fld>
             <a:endParaRPr lang="en-IN"/>
           </a:p>
@@ -605,7 +605,7 @@
           <a:p>
             <a:fld id="{E695A440-134A-41B0-A0D1-8FBBAB98E21C}" type="datetimeFigureOut">
               <a:rPr lang="en-IN" smtClean="0"/>
-              <a:t>14-06-2022</a:t>
+              <a:t>15-06-2022</a:t>
             </a:fld>
             <a:endParaRPr lang="en-IN"/>
           </a:p>
@@ -785,7 +785,7 @@
           <a:p>
             <a:fld id="{E695A440-134A-41B0-A0D1-8FBBAB98E21C}" type="datetimeFigureOut">
               <a:rPr lang="en-IN" smtClean="0"/>
-              <a:t>14-06-2022</a:t>
+              <a:t>15-06-2022</a:t>
             </a:fld>
             <a:endParaRPr lang="en-IN"/>
           </a:p>
@@ -955,7 +955,7 @@
           <a:p>
             <a:fld id="{E695A440-134A-41B0-A0D1-8FBBAB98E21C}" type="datetimeFigureOut">
               <a:rPr lang="en-IN" smtClean="0"/>
-              <a:t>14-06-2022</a:t>
+              <a:t>15-06-2022</a:t>
             </a:fld>
             <a:endParaRPr lang="en-IN"/>
           </a:p>
@@ -1201,7 +1201,7 @@
           <a:p>
             <a:fld id="{E695A440-134A-41B0-A0D1-8FBBAB98E21C}" type="datetimeFigureOut">
               <a:rPr lang="en-IN" smtClean="0"/>
-              <a:t>14-06-2022</a:t>
+              <a:t>15-06-2022</a:t>
             </a:fld>
             <a:endParaRPr lang="en-IN"/>
           </a:p>
@@ -1433,7 +1433,7 @@
           <a:p>
             <a:fld id="{E695A440-134A-41B0-A0D1-8FBBAB98E21C}" type="datetimeFigureOut">
               <a:rPr lang="en-IN" smtClean="0"/>
-              <a:t>14-06-2022</a:t>
+              <a:t>15-06-2022</a:t>
             </a:fld>
             <a:endParaRPr lang="en-IN"/>
           </a:p>
@@ -1800,7 +1800,7 @@
           <a:p>
             <a:fld id="{E695A440-134A-41B0-A0D1-8FBBAB98E21C}" type="datetimeFigureOut">
               <a:rPr lang="en-IN" smtClean="0"/>
-              <a:t>14-06-2022</a:t>
+              <a:t>15-06-2022</a:t>
             </a:fld>
             <a:endParaRPr lang="en-IN"/>
           </a:p>
@@ -1918,7 +1918,7 @@
           <a:p>
             <a:fld id="{E695A440-134A-41B0-A0D1-8FBBAB98E21C}" type="datetimeFigureOut">
               <a:rPr lang="en-IN" smtClean="0"/>
-              <a:t>14-06-2022</a:t>
+              <a:t>15-06-2022</a:t>
             </a:fld>
             <a:endParaRPr lang="en-IN"/>
           </a:p>
@@ -2013,7 +2013,7 @@
           <a:p>
             <a:fld id="{E695A440-134A-41B0-A0D1-8FBBAB98E21C}" type="datetimeFigureOut">
               <a:rPr lang="en-IN" smtClean="0"/>
-              <a:t>14-06-2022</a:t>
+              <a:t>15-06-2022</a:t>
             </a:fld>
             <a:endParaRPr lang="en-IN"/>
           </a:p>
@@ -2290,7 +2290,7 @@
           <a:p>
             <a:fld id="{E695A440-134A-41B0-A0D1-8FBBAB98E21C}" type="datetimeFigureOut">
               <a:rPr lang="en-IN" smtClean="0"/>
-              <a:t>14-06-2022</a:t>
+              <a:t>15-06-2022</a:t>
             </a:fld>
             <a:endParaRPr lang="en-IN"/>
           </a:p>
@@ -2543,7 +2543,7 @@
           <a:p>
             <a:fld id="{E695A440-134A-41B0-A0D1-8FBBAB98E21C}" type="datetimeFigureOut">
               <a:rPr lang="en-IN" smtClean="0"/>
-              <a:t>14-06-2022</a:t>
+              <a:t>15-06-2022</a:t>
             </a:fld>
             <a:endParaRPr lang="en-IN"/>
           </a:p>
@@ -2756,7 +2756,7 @@
           <a:p>
             <a:fld id="{E695A440-134A-41B0-A0D1-8FBBAB98E21C}" type="datetimeFigureOut">
               <a:rPr lang="en-IN" smtClean="0"/>
-              <a:t>14-06-2022</a:t>
+              <a:t>15-06-2022</a:t>
             </a:fld>
             <a:endParaRPr lang="en-IN" dirty="0"/>
           </a:p>
@@ -3657,11 +3657,7 @@
             </a:r>
             <a:r>
               <a:rPr lang="en-US" dirty="0" smtClean="0"/>
-              <a:t> notebook </a:t>
-            </a:r>
-            <a:r>
-              <a:rPr lang="en-US" dirty="0" smtClean="0"/>
-              <a:t>IDE. Like anaconda or </a:t>
+              <a:t> notebook IDE. Like anaconda or </a:t>
             </a:r>
             <a:r>
               <a:rPr lang="en-US" dirty="0" err="1" smtClean="0"/>
@@ -3709,11 +3705,7 @@
             <a:pPr algn="l"/>
             <a:r>
               <a:rPr lang="en-US" b="1" u="sng" dirty="0"/>
-              <a:t>Step </a:t>
-            </a:r>
-            <a:r>
-              <a:rPr lang="en-US" b="1" u="sng" dirty="0"/>
-              <a:t>3:</a:t>
+              <a:t>Step 3:</a:t>
             </a:r>
             <a:r>
               <a:rPr lang="en-US" dirty="0" smtClean="0"/>
@@ -3749,11 +3741,7 @@
             <a:pPr algn="l"/>
             <a:r>
               <a:rPr lang="en-US" b="1" u="sng" dirty="0"/>
-              <a:t>Step </a:t>
-            </a:r>
-            <a:r>
-              <a:rPr lang="en-US" b="1" u="sng" dirty="0"/>
-              <a:t>4: </a:t>
+              <a:t>Step 4: </a:t>
             </a:r>
             <a:r>
               <a:rPr lang="en-US" dirty="0"/>
@@ -3777,11 +3765,7 @@
             <a:pPr algn="l"/>
             <a:r>
               <a:rPr lang="en-US" b="1" u="sng" dirty="0"/>
-              <a:t>Step </a:t>
-            </a:r>
-            <a:r>
-              <a:rPr lang="en-US" b="1" u="sng" dirty="0"/>
-              <a:t>5: </a:t>
+              <a:t>Step 5: </a:t>
             </a:r>
             <a:r>
               <a:rPr lang="en-US" dirty="0"/>
@@ -3789,11 +3773,7 @@
             </a:r>
             <a:r>
               <a:rPr lang="en-US" dirty="0" smtClean="0"/>
-              <a:t>LSTM Model</a:t>
-            </a:r>
-            <a:r>
-              <a:rPr lang="en-US" dirty="0" smtClean="0"/>
-              <a:t> </a:t>
+              <a:t>LSTM Model </a:t>
             </a:r>
             <a:r>
               <a:rPr lang="en-US" dirty="0"/>
@@ -3804,8 +3784,8 @@
               <a:t>setting up the </a:t>
             </a:r>
             <a:r>
-              <a:rPr lang="en-US" dirty="0" err="1" smtClean="0"/>
-              <a:t>hyperparameters</a:t>
+              <a:rPr lang="en-US" dirty="0" smtClean="0"/>
+              <a:t>hyper-parameters</a:t>
             </a:r>
             <a:r>
               <a:rPr lang="en-US" dirty="0" smtClean="0"/>
@@ -3845,17 +3825,12 @@
               <a:rPr lang="en-US" dirty="0"/>
               <a:t>.</a:t>
             </a:r>
-            <a:endParaRPr lang="en-US" dirty="0"/>
           </a:p>
           <a:p>
             <a:pPr algn="l"/>
             <a:r>
               <a:rPr lang="en-US" b="1" u="sng" dirty="0"/>
-              <a:t>Step </a:t>
-            </a:r>
-            <a:r>
-              <a:rPr lang="en-US" b="1" u="sng" dirty="0"/>
-              <a:t>7</a:t>
+              <a:t>Step 7</a:t>
             </a:r>
             <a:r>
               <a:rPr lang="en-US" dirty="0" smtClean="0"/>
@@ -4084,11 +4059,7 @@
             </a:r>
             <a:r>
               <a:rPr lang="en-US" dirty="0" smtClean="0"/>
-              <a:t>Feature Engineering</a:t>
-            </a:r>
-            <a:r>
-              <a:rPr lang="en-US" dirty="0" smtClean="0"/>
-              <a:t>: </a:t>
+              <a:t>Feature Engineering: </a:t>
             </a:r>
             <a:r>
               <a:rPr lang="en-US" dirty="0"/>
@@ -4226,7 +4197,7 @@
                 <a16:creationId xmlns:a16="http://schemas.microsoft.com/office/drawing/2014/main" id="{A5711A0E-A428-4ED1-96CB-33D69FD842E4}"/>
               </a:ext>
               <a:ext uri="{C183D7F6-B498-43B3-948B-1728B52AA6E4}">
-                <adec:decorative xmlns="" xmlns:adec="http://schemas.microsoft.com/office/drawing/2017/decorative" val="1"/>
+                <adec:decorative xmlns:adec="http://schemas.microsoft.com/office/drawing/2017/decorative" xmlns="" val="1"/>
               </a:ext>
             </a:extLst>
           </p:cNvPr>
@@ -4540,7 +4511,295 @@
   <p:timing>
     <p:tnLst>
       <p:par>
-        <p:cTn id="1" dur="indefinite" restart="never" nodeType="tmRoot"/>
+        <p:cTn id="1" dur="indefinite" restart="never" nodeType="tmRoot">
+          <p:childTnLst>
+            <p:seq concurrent="1" nextAc="seek">
+              <p:cTn id="2" dur="indefinite" nodeType="mainSeq">
+                <p:childTnLst>
+                  <p:par>
+                    <p:cTn id="3" fill="hold">
+                      <p:stCondLst>
+                        <p:cond delay="indefinite"/>
+                      </p:stCondLst>
+                      <p:childTnLst>
+                        <p:par>
+                          <p:cTn id="4" fill="hold">
+                            <p:stCondLst>
+                              <p:cond delay="0"/>
+                            </p:stCondLst>
+                            <p:childTnLst>
+                              <p:par>
+                                <p:cTn id="5" presetID="10" presetClass="entr" presetSubtype="0" fill="hold" nodeType="clickEffect">
+                                  <p:stCondLst>
+                                    <p:cond delay="0"/>
+                                  </p:stCondLst>
+                                  <p:childTnLst>
+                                    <p:set>
+                                      <p:cBhvr>
+                                        <p:cTn id="6" dur="1" fill="hold">
+                                          <p:stCondLst>
+                                            <p:cond delay="0"/>
+                                          </p:stCondLst>
+                                        </p:cTn>
+                                        <p:tgtEl>
+                                          <p:spTgt spid="17"/>
+                                        </p:tgtEl>
+                                        <p:attrNameLst>
+                                          <p:attrName>style.visibility</p:attrName>
+                                        </p:attrNameLst>
+                                      </p:cBhvr>
+                                      <p:to>
+                                        <p:strVal val="visible"/>
+                                      </p:to>
+                                    </p:set>
+                                    <p:animEffect transition="in" filter="fade">
+                                      <p:cBhvr>
+                                        <p:cTn id="7" dur="500"/>
+                                        <p:tgtEl>
+                                          <p:spTgt spid="17"/>
+                                        </p:tgtEl>
+                                      </p:cBhvr>
+                                    </p:animEffect>
+                                  </p:childTnLst>
+                                </p:cTn>
+                              </p:par>
+                            </p:childTnLst>
+                          </p:cTn>
+                        </p:par>
+                      </p:childTnLst>
+                    </p:cTn>
+                  </p:par>
+                  <p:par>
+                    <p:cTn id="8" fill="hold">
+                      <p:stCondLst>
+                        <p:cond delay="indefinite"/>
+                      </p:stCondLst>
+                      <p:childTnLst>
+                        <p:par>
+                          <p:cTn id="9" fill="hold">
+                            <p:stCondLst>
+                              <p:cond delay="0"/>
+                            </p:stCondLst>
+                            <p:childTnLst>
+                              <p:par>
+                                <p:cTn id="10" presetID="10" presetClass="entr" presetSubtype="0" fill="hold" nodeType="clickEffect">
+                                  <p:stCondLst>
+                                    <p:cond delay="0"/>
+                                  </p:stCondLst>
+                                  <p:childTnLst>
+                                    <p:set>
+                                      <p:cBhvr>
+                                        <p:cTn id="11" dur="1" fill="hold">
+                                          <p:stCondLst>
+                                            <p:cond delay="0"/>
+                                          </p:stCondLst>
+                                        </p:cTn>
+                                        <p:tgtEl>
+                                          <p:spTgt spid="11"/>
+                                        </p:tgtEl>
+                                        <p:attrNameLst>
+                                          <p:attrName>style.visibility</p:attrName>
+                                        </p:attrNameLst>
+                                      </p:cBhvr>
+                                      <p:to>
+                                        <p:strVal val="visible"/>
+                                      </p:to>
+                                    </p:set>
+                                    <p:animEffect transition="in" filter="fade">
+                                      <p:cBhvr>
+                                        <p:cTn id="12" dur="500"/>
+                                        <p:tgtEl>
+                                          <p:spTgt spid="11"/>
+                                        </p:tgtEl>
+                                      </p:cBhvr>
+                                    </p:animEffect>
+                                  </p:childTnLst>
+                                </p:cTn>
+                              </p:par>
+                            </p:childTnLst>
+                          </p:cTn>
+                        </p:par>
+                      </p:childTnLst>
+                    </p:cTn>
+                  </p:par>
+                  <p:par>
+                    <p:cTn id="13" fill="hold">
+                      <p:stCondLst>
+                        <p:cond delay="indefinite"/>
+                      </p:stCondLst>
+                      <p:childTnLst>
+                        <p:par>
+                          <p:cTn id="14" fill="hold">
+                            <p:stCondLst>
+                              <p:cond delay="0"/>
+                            </p:stCondLst>
+                            <p:childTnLst>
+                              <p:par>
+                                <p:cTn id="15" presetID="10" presetClass="entr" presetSubtype="0" fill="hold" nodeType="clickEffect">
+                                  <p:stCondLst>
+                                    <p:cond delay="0"/>
+                                  </p:stCondLst>
+                                  <p:childTnLst>
+                                    <p:set>
+                                      <p:cBhvr>
+                                        <p:cTn id="16" dur="1" fill="hold">
+                                          <p:stCondLst>
+                                            <p:cond delay="0"/>
+                                          </p:stCondLst>
+                                        </p:cTn>
+                                        <p:tgtEl>
+                                          <p:spTgt spid="15"/>
+                                        </p:tgtEl>
+                                        <p:attrNameLst>
+                                          <p:attrName>style.visibility</p:attrName>
+                                        </p:attrNameLst>
+                                      </p:cBhvr>
+                                      <p:to>
+                                        <p:strVal val="visible"/>
+                                      </p:to>
+                                    </p:set>
+                                    <p:animEffect transition="in" filter="fade">
+                                      <p:cBhvr>
+                                        <p:cTn id="17" dur="500"/>
+                                        <p:tgtEl>
+                                          <p:spTgt spid="15"/>
+                                        </p:tgtEl>
+                                      </p:cBhvr>
+                                    </p:animEffect>
+                                  </p:childTnLst>
+                                </p:cTn>
+                              </p:par>
+                            </p:childTnLst>
+                          </p:cTn>
+                        </p:par>
+                      </p:childTnLst>
+                    </p:cTn>
+                  </p:par>
+                  <p:par>
+                    <p:cTn id="18" fill="hold">
+                      <p:stCondLst>
+                        <p:cond delay="indefinite"/>
+                      </p:stCondLst>
+                      <p:childTnLst>
+                        <p:par>
+                          <p:cTn id="19" fill="hold">
+                            <p:stCondLst>
+                              <p:cond delay="0"/>
+                            </p:stCondLst>
+                            <p:childTnLst>
+                              <p:par>
+                                <p:cTn id="20" presetID="10" presetClass="entr" presetSubtype="0" fill="hold" nodeType="clickEffect">
+                                  <p:stCondLst>
+                                    <p:cond delay="0"/>
+                                  </p:stCondLst>
+                                  <p:childTnLst>
+                                    <p:set>
+                                      <p:cBhvr>
+                                        <p:cTn id="21" dur="1" fill="hold">
+                                          <p:stCondLst>
+                                            <p:cond delay="0"/>
+                                          </p:stCondLst>
+                                        </p:cTn>
+                                        <p:tgtEl>
+                                          <p:spTgt spid="5"/>
+                                        </p:tgtEl>
+                                        <p:attrNameLst>
+                                          <p:attrName>style.visibility</p:attrName>
+                                        </p:attrNameLst>
+                                      </p:cBhvr>
+                                      <p:to>
+                                        <p:strVal val="visible"/>
+                                      </p:to>
+                                    </p:set>
+                                    <p:animEffect transition="in" filter="fade">
+                                      <p:cBhvr>
+                                        <p:cTn id="22" dur="500"/>
+                                        <p:tgtEl>
+                                          <p:spTgt spid="5"/>
+                                        </p:tgtEl>
+                                      </p:cBhvr>
+                                    </p:animEffect>
+                                  </p:childTnLst>
+                                </p:cTn>
+                              </p:par>
+                            </p:childTnLst>
+                          </p:cTn>
+                        </p:par>
+                      </p:childTnLst>
+                    </p:cTn>
+                  </p:par>
+                  <p:par>
+                    <p:cTn id="23" fill="hold">
+                      <p:stCondLst>
+                        <p:cond delay="indefinite"/>
+                      </p:stCondLst>
+                      <p:childTnLst>
+                        <p:par>
+                          <p:cTn id="24" fill="hold">
+                            <p:stCondLst>
+                              <p:cond delay="0"/>
+                            </p:stCondLst>
+                            <p:childTnLst>
+                              <p:par>
+                                <p:cTn id="25" presetID="10" presetClass="entr" presetSubtype="0" fill="hold" nodeType="clickEffect">
+                                  <p:stCondLst>
+                                    <p:cond delay="0"/>
+                                  </p:stCondLst>
+                                  <p:childTnLst>
+                                    <p:set>
+                                      <p:cBhvr>
+                                        <p:cTn id="26" dur="1" fill="hold">
+                                          <p:stCondLst>
+                                            <p:cond delay="0"/>
+                                          </p:stCondLst>
+                                        </p:cTn>
+                                        <p:tgtEl>
+                                          <p:spTgt spid="13"/>
+                                        </p:tgtEl>
+                                        <p:attrNameLst>
+                                          <p:attrName>style.visibility</p:attrName>
+                                        </p:attrNameLst>
+                                      </p:cBhvr>
+                                      <p:to>
+                                        <p:strVal val="visible"/>
+                                      </p:to>
+                                    </p:set>
+                                    <p:animEffect transition="in" filter="fade">
+                                      <p:cBhvr>
+                                        <p:cTn id="27" dur="500"/>
+                                        <p:tgtEl>
+                                          <p:spTgt spid="13"/>
+                                        </p:tgtEl>
+                                      </p:cBhvr>
+                                    </p:animEffect>
+                                  </p:childTnLst>
+                                </p:cTn>
+                              </p:par>
+                            </p:childTnLst>
+                          </p:cTn>
+                        </p:par>
+                      </p:childTnLst>
+                    </p:cTn>
+                  </p:par>
+                </p:childTnLst>
+              </p:cTn>
+              <p:prevCondLst>
+                <p:cond evt="onPrev" delay="0">
+                  <p:tgtEl>
+                    <p:sldTgt/>
+                  </p:tgtEl>
+                </p:cond>
+              </p:prevCondLst>
+              <p:nextCondLst>
+                <p:cond evt="onNext" delay="0">
+                  <p:tgtEl>
+                    <p:sldTgt/>
+                  </p:tgtEl>
+                </p:cond>
+              </p:nextCondLst>
+            </p:seq>
+          </p:childTnLst>
+        </p:cTn>
       </p:par>
     </p:tnLst>
   </p:timing>
@@ -4649,7 +4908,212 @@
   <p:timing>
     <p:tnLst>
       <p:par>
-        <p:cTn id="1" dur="indefinite" restart="never" nodeType="tmRoot"/>
+        <p:cTn id="1" dur="indefinite" restart="never" nodeType="tmRoot">
+          <p:childTnLst>
+            <p:seq concurrent="1" nextAc="seek">
+              <p:cTn id="2" dur="indefinite" nodeType="mainSeq">
+                <p:childTnLst>
+                  <p:par>
+                    <p:cTn id="3" fill="hold">
+                      <p:stCondLst>
+                        <p:cond delay="indefinite"/>
+                      </p:stCondLst>
+                      <p:childTnLst>
+                        <p:par>
+                          <p:cTn id="4" fill="hold">
+                            <p:stCondLst>
+                              <p:cond delay="0"/>
+                            </p:stCondLst>
+                            <p:childTnLst>
+                              <p:par>
+                                <p:cTn id="5" presetID="2" presetClass="entr" presetSubtype="4" fill="hold" nodeType="clickEffect">
+                                  <p:stCondLst>
+                                    <p:cond delay="0"/>
+                                  </p:stCondLst>
+                                  <p:childTnLst>
+                                    <p:set>
+                                      <p:cBhvr>
+                                        <p:cTn id="6" dur="1" fill="hold">
+                                          <p:stCondLst>
+                                            <p:cond delay="0"/>
+                                          </p:stCondLst>
+                                        </p:cTn>
+                                        <p:tgtEl>
+                                          <p:spTgt spid="5"/>
+                                        </p:tgtEl>
+                                        <p:attrNameLst>
+                                          <p:attrName>style.visibility</p:attrName>
+                                        </p:attrNameLst>
+                                      </p:cBhvr>
+                                      <p:to>
+                                        <p:strVal val="visible"/>
+                                      </p:to>
+                                    </p:set>
+                                    <p:anim calcmode="lin" valueType="num">
+                                      <p:cBhvr additive="base">
+                                        <p:cTn id="7" dur="500" fill="hold"/>
+                                        <p:tgtEl>
+                                          <p:spTgt spid="5"/>
+                                        </p:tgtEl>
+                                        <p:attrNameLst>
+                                          <p:attrName>ppt_x</p:attrName>
+                                        </p:attrNameLst>
+                                      </p:cBhvr>
+                                      <p:tavLst>
+                                        <p:tav tm="0">
+                                          <p:val>
+                                            <p:strVal val="#ppt_x"/>
+                                          </p:val>
+                                        </p:tav>
+                                        <p:tav tm="100000">
+                                          <p:val>
+                                            <p:strVal val="#ppt_x"/>
+                                          </p:val>
+                                        </p:tav>
+                                      </p:tavLst>
+                                    </p:anim>
+                                    <p:anim calcmode="lin" valueType="num">
+                                      <p:cBhvr additive="base">
+                                        <p:cTn id="8" dur="500" fill="hold"/>
+                                        <p:tgtEl>
+                                          <p:spTgt spid="5"/>
+                                        </p:tgtEl>
+                                        <p:attrNameLst>
+                                          <p:attrName>ppt_y</p:attrName>
+                                        </p:attrNameLst>
+                                      </p:cBhvr>
+                                      <p:tavLst>
+                                        <p:tav tm="0">
+                                          <p:val>
+                                            <p:strVal val="1+#ppt_h/2"/>
+                                          </p:val>
+                                        </p:tav>
+                                        <p:tav tm="100000">
+                                          <p:val>
+                                            <p:strVal val="#ppt_y"/>
+                                          </p:val>
+                                        </p:tav>
+                                      </p:tavLst>
+                                    </p:anim>
+                                  </p:childTnLst>
+                                </p:cTn>
+                              </p:par>
+                            </p:childTnLst>
+                          </p:cTn>
+                        </p:par>
+                      </p:childTnLst>
+                    </p:cTn>
+                  </p:par>
+                  <p:par>
+                    <p:cTn id="9" fill="hold">
+                      <p:stCondLst>
+                        <p:cond delay="indefinite"/>
+                      </p:stCondLst>
+                      <p:childTnLst>
+                        <p:par>
+                          <p:cTn id="10" fill="hold">
+                            <p:stCondLst>
+                              <p:cond delay="0"/>
+                            </p:stCondLst>
+                            <p:childTnLst>
+                              <p:par>
+                                <p:cTn id="11" presetID="2" presetClass="entr" presetSubtype="4" fill="hold" nodeType="clickEffect">
+                                  <p:stCondLst>
+                                    <p:cond delay="0"/>
+                                  </p:stCondLst>
+                                  <p:childTnLst>
+                                    <p:set>
+                                      <p:cBhvr>
+                                        <p:cTn id="12" dur="1" fill="hold">
+                                          <p:stCondLst>
+                                            <p:cond delay="0"/>
+                                          </p:stCondLst>
+                                        </p:cTn>
+                                        <p:tgtEl>
+                                          <p:spTgt spid="4"/>
+                                        </p:tgtEl>
+                                        <p:attrNameLst>
+                                          <p:attrName>style.visibility</p:attrName>
+                                        </p:attrNameLst>
+                                      </p:cBhvr>
+                                      <p:to>
+                                        <p:strVal val="visible"/>
+                                      </p:to>
+                                    </p:set>
+                                    <p:anim calcmode="lin" valueType="num">
+                                      <p:cBhvr additive="base">
+                                        <p:cTn id="13" dur="500" fill="hold"/>
+                                        <p:tgtEl>
+                                          <p:spTgt spid="4"/>
+                                        </p:tgtEl>
+                                        <p:attrNameLst>
+                                          <p:attrName>ppt_x</p:attrName>
+                                        </p:attrNameLst>
+                                      </p:cBhvr>
+                                      <p:tavLst>
+                                        <p:tav tm="0">
+                                          <p:val>
+                                            <p:strVal val="#ppt_x"/>
+                                          </p:val>
+                                        </p:tav>
+                                        <p:tav tm="100000">
+                                          <p:val>
+                                            <p:strVal val="#ppt_x"/>
+                                          </p:val>
+                                        </p:tav>
+                                      </p:tavLst>
+                                    </p:anim>
+                                    <p:anim calcmode="lin" valueType="num">
+                                      <p:cBhvr additive="base">
+                                        <p:cTn id="14" dur="500" fill="hold"/>
+                                        <p:tgtEl>
+                                          <p:spTgt spid="4"/>
+                                        </p:tgtEl>
+                                        <p:attrNameLst>
+                                          <p:attrName>ppt_y</p:attrName>
+                                        </p:attrNameLst>
+                                      </p:cBhvr>
+                                      <p:tavLst>
+                                        <p:tav tm="0">
+                                          <p:val>
+                                            <p:strVal val="1+#ppt_h/2"/>
+                                          </p:val>
+                                        </p:tav>
+                                        <p:tav tm="100000">
+                                          <p:val>
+                                            <p:strVal val="#ppt_y"/>
+                                          </p:val>
+                                        </p:tav>
+                                      </p:tavLst>
+                                    </p:anim>
+                                  </p:childTnLst>
+                                </p:cTn>
+                              </p:par>
+                            </p:childTnLst>
+                          </p:cTn>
+                        </p:par>
+                      </p:childTnLst>
+                    </p:cTn>
+                  </p:par>
+                </p:childTnLst>
+              </p:cTn>
+              <p:prevCondLst>
+                <p:cond evt="onPrev" delay="0">
+                  <p:tgtEl>
+                    <p:sldTgt/>
+                  </p:tgtEl>
+                </p:cond>
+              </p:prevCondLst>
+              <p:nextCondLst>
+                <p:cond evt="onNext" delay="0">
+                  <p:tgtEl>
+                    <p:sldTgt/>
+                  </p:tgtEl>
+                </p:cond>
+              </p:nextCondLst>
+            </p:seq>
+          </p:childTnLst>
+        </p:cTn>
       </p:par>
     </p:tnLst>
   </p:timing>
@@ -4758,7 +5222,212 @@
   <p:timing>
     <p:tnLst>
       <p:par>
-        <p:cTn id="1" dur="indefinite" restart="never" nodeType="tmRoot"/>
+        <p:cTn id="1" dur="indefinite" restart="never" nodeType="tmRoot">
+          <p:childTnLst>
+            <p:seq concurrent="1" nextAc="seek">
+              <p:cTn id="2" dur="indefinite" nodeType="mainSeq">
+                <p:childTnLst>
+                  <p:par>
+                    <p:cTn id="3" fill="hold">
+                      <p:stCondLst>
+                        <p:cond delay="indefinite"/>
+                      </p:stCondLst>
+                      <p:childTnLst>
+                        <p:par>
+                          <p:cTn id="4" fill="hold">
+                            <p:stCondLst>
+                              <p:cond delay="0"/>
+                            </p:stCondLst>
+                            <p:childTnLst>
+                              <p:par>
+                                <p:cTn id="5" presetID="2" presetClass="entr" presetSubtype="4" fill="hold" nodeType="clickEffect">
+                                  <p:stCondLst>
+                                    <p:cond delay="0"/>
+                                  </p:stCondLst>
+                                  <p:childTnLst>
+                                    <p:set>
+                                      <p:cBhvr>
+                                        <p:cTn id="6" dur="1" fill="hold">
+                                          <p:stCondLst>
+                                            <p:cond delay="0"/>
+                                          </p:stCondLst>
+                                        </p:cTn>
+                                        <p:tgtEl>
+                                          <p:spTgt spid="2"/>
+                                        </p:tgtEl>
+                                        <p:attrNameLst>
+                                          <p:attrName>style.visibility</p:attrName>
+                                        </p:attrNameLst>
+                                      </p:cBhvr>
+                                      <p:to>
+                                        <p:strVal val="visible"/>
+                                      </p:to>
+                                    </p:set>
+                                    <p:anim calcmode="lin" valueType="num">
+                                      <p:cBhvr additive="base">
+                                        <p:cTn id="7" dur="500" fill="hold"/>
+                                        <p:tgtEl>
+                                          <p:spTgt spid="2"/>
+                                        </p:tgtEl>
+                                        <p:attrNameLst>
+                                          <p:attrName>ppt_x</p:attrName>
+                                        </p:attrNameLst>
+                                      </p:cBhvr>
+                                      <p:tavLst>
+                                        <p:tav tm="0">
+                                          <p:val>
+                                            <p:strVal val="#ppt_x"/>
+                                          </p:val>
+                                        </p:tav>
+                                        <p:tav tm="100000">
+                                          <p:val>
+                                            <p:strVal val="#ppt_x"/>
+                                          </p:val>
+                                        </p:tav>
+                                      </p:tavLst>
+                                    </p:anim>
+                                    <p:anim calcmode="lin" valueType="num">
+                                      <p:cBhvr additive="base">
+                                        <p:cTn id="8" dur="500" fill="hold"/>
+                                        <p:tgtEl>
+                                          <p:spTgt spid="2"/>
+                                        </p:tgtEl>
+                                        <p:attrNameLst>
+                                          <p:attrName>ppt_y</p:attrName>
+                                        </p:attrNameLst>
+                                      </p:cBhvr>
+                                      <p:tavLst>
+                                        <p:tav tm="0">
+                                          <p:val>
+                                            <p:strVal val="1+#ppt_h/2"/>
+                                          </p:val>
+                                        </p:tav>
+                                        <p:tav tm="100000">
+                                          <p:val>
+                                            <p:strVal val="#ppt_y"/>
+                                          </p:val>
+                                        </p:tav>
+                                      </p:tavLst>
+                                    </p:anim>
+                                  </p:childTnLst>
+                                </p:cTn>
+                              </p:par>
+                            </p:childTnLst>
+                          </p:cTn>
+                        </p:par>
+                      </p:childTnLst>
+                    </p:cTn>
+                  </p:par>
+                  <p:par>
+                    <p:cTn id="9" fill="hold">
+                      <p:stCondLst>
+                        <p:cond delay="indefinite"/>
+                      </p:stCondLst>
+                      <p:childTnLst>
+                        <p:par>
+                          <p:cTn id="10" fill="hold">
+                            <p:stCondLst>
+                              <p:cond delay="0"/>
+                            </p:stCondLst>
+                            <p:childTnLst>
+                              <p:par>
+                                <p:cTn id="11" presetID="2" presetClass="entr" presetSubtype="4" fill="hold" nodeType="clickEffect">
+                                  <p:stCondLst>
+                                    <p:cond delay="0"/>
+                                  </p:stCondLst>
+                                  <p:childTnLst>
+                                    <p:set>
+                                      <p:cBhvr>
+                                        <p:cTn id="12" dur="1" fill="hold">
+                                          <p:stCondLst>
+                                            <p:cond delay="0"/>
+                                          </p:stCondLst>
+                                        </p:cTn>
+                                        <p:tgtEl>
+                                          <p:spTgt spid="3"/>
+                                        </p:tgtEl>
+                                        <p:attrNameLst>
+                                          <p:attrName>style.visibility</p:attrName>
+                                        </p:attrNameLst>
+                                      </p:cBhvr>
+                                      <p:to>
+                                        <p:strVal val="visible"/>
+                                      </p:to>
+                                    </p:set>
+                                    <p:anim calcmode="lin" valueType="num">
+                                      <p:cBhvr additive="base">
+                                        <p:cTn id="13" dur="500" fill="hold"/>
+                                        <p:tgtEl>
+                                          <p:spTgt spid="3"/>
+                                        </p:tgtEl>
+                                        <p:attrNameLst>
+                                          <p:attrName>ppt_x</p:attrName>
+                                        </p:attrNameLst>
+                                      </p:cBhvr>
+                                      <p:tavLst>
+                                        <p:tav tm="0">
+                                          <p:val>
+                                            <p:strVal val="#ppt_x"/>
+                                          </p:val>
+                                        </p:tav>
+                                        <p:tav tm="100000">
+                                          <p:val>
+                                            <p:strVal val="#ppt_x"/>
+                                          </p:val>
+                                        </p:tav>
+                                      </p:tavLst>
+                                    </p:anim>
+                                    <p:anim calcmode="lin" valueType="num">
+                                      <p:cBhvr additive="base">
+                                        <p:cTn id="14" dur="500" fill="hold"/>
+                                        <p:tgtEl>
+                                          <p:spTgt spid="3"/>
+                                        </p:tgtEl>
+                                        <p:attrNameLst>
+                                          <p:attrName>ppt_y</p:attrName>
+                                        </p:attrNameLst>
+                                      </p:cBhvr>
+                                      <p:tavLst>
+                                        <p:tav tm="0">
+                                          <p:val>
+                                            <p:strVal val="1+#ppt_h/2"/>
+                                          </p:val>
+                                        </p:tav>
+                                        <p:tav tm="100000">
+                                          <p:val>
+                                            <p:strVal val="#ppt_y"/>
+                                          </p:val>
+                                        </p:tav>
+                                      </p:tavLst>
+                                    </p:anim>
+                                  </p:childTnLst>
+                                </p:cTn>
+                              </p:par>
+                            </p:childTnLst>
+                          </p:cTn>
+                        </p:par>
+                      </p:childTnLst>
+                    </p:cTn>
+                  </p:par>
+                </p:childTnLst>
+              </p:cTn>
+              <p:prevCondLst>
+                <p:cond evt="onPrev" delay="0">
+                  <p:tgtEl>
+                    <p:sldTgt/>
+                  </p:tgtEl>
+                </p:cond>
+              </p:prevCondLst>
+              <p:nextCondLst>
+                <p:cond evt="onNext" delay="0">
+                  <p:tgtEl>
+                    <p:sldTgt/>
+                  </p:tgtEl>
+                </p:cond>
+              </p:nextCondLst>
+            </p:seq>
+          </p:childTnLst>
+        </p:cTn>
       </p:par>
     </p:tnLst>
   </p:timing>
@@ -4867,7 +5536,212 @@
   <p:timing>
     <p:tnLst>
       <p:par>
-        <p:cTn id="1" dur="indefinite" restart="never" nodeType="tmRoot"/>
+        <p:cTn id="1" dur="indefinite" restart="never" nodeType="tmRoot">
+          <p:childTnLst>
+            <p:seq concurrent="1" nextAc="seek">
+              <p:cTn id="2" dur="indefinite" nodeType="mainSeq">
+                <p:childTnLst>
+                  <p:par>
+                    <p:cTn id="3" fill="hold">
+                      <p:stCondLst>
+                        <p:cond delay="indefinite"/>
+                      </p:stCondLst>
+                      <p:childTnLst>
+                        <p:par>
+                          <p:cTn id="4" fill="hold">
+                            <p:stCondLst>
+                              <p:cond delay="0"/>
+                            </p:stCondLst>
+                            <p:childTnLst>
+                              <p:par>
+                                <p:cTn id="5" presetID="2" presetClass="entr" presetSubtype="4" fill="hold" nodeType="clickEffect">
+                                  <p:stCondLst>
+                                    <p:cond delay="0"/>
+                                  </p:stCondLst>
+                                  <p:childTnLst>
+                                    <p:set>
+                                      <p:cBhvr>
+                                        <p:cTn id="6" dur="1" fill="hold">
+                                          <p:stCondLst>
+                                            <p:cond delay="0"/>
+                                          </p:stCondLst>
+                                        </p:cTn>
+                                        <p:tgtEl>
+                                          <p:spTgt spid="3"/>
+                                        </p:tgtEl>
+                                        <p:attrNameLst>
+                                          <p:attrName>style.visibility</p:attrName>
+                                        </p:attrNameLst>
+                                      </p:cBhvr>
+                                      <p:to>
+                                        <p:strVal val="visible"/>
+                                      </p:to>
+                                    </p:set>
+                                    <p:anim calcmode="lin" valueType="num">
+                                      <p:cBhvr additive="base">
+                                        <p:cTn id="7" dur="500" fill="hold"/>
+                                        <p:tgtEl>
+                                          <p:spTgt spid="3"/>
+                                        </p:tgtEl>
+                                        <p:attrNameLst>
+                                          <p:attrName>ppt_x</p:attrName>
+                                        </p:attrNameLst>
+                                      </p:cBhvr>
+                                      <p:tavLst>
+                                        <p:tav tm="0">
+                                          <p:val>
+                                            <p:strVal val="#ppt_x"/>
+                                          </p:val>
+                                        </p:tav>
+                                        <p:tav tm="100000">
+                                          <p:val>
+                                            <p:strVal val="#ppt_x"/>
+                                          </p:val>
+                                        </p:tav>
+                                      </p:tavLst>
+                                    </p:anim>
+                                    <p:anim calcmode="lin" valueType="num">
+                                      <p:cBhvr additive="base">
+                                        <p:cTn id="8" dur="500" fill="hold"/>
+                                        <p:tgtEl>
+                                          <p:spTgt spid="3"/>
+                                        </p:tgtEl>
+                                        <p:attrNameLst>
+                                          <p:attrName>ppt_y</p:attrName>
+                                        </p:attrNameLst>
+                                      </p:cBhvr>
+                                      <p:tavLst>
+                                        <p:tav tm="0">
+                                          <p:val>
+                                            <p:strVal val="1+#ppt_h/2"/>
+                                          </p:val>
+                                        </p:tav>
+                                        <p:tav tm="100000">
+                                          <p:val>
+                                            <p:strVal val="#ppt_y"/>
+                                          </p:val>
+                                        </p:tav>
+                                      </p:tavLst>
+                                    </p:anim>
+                                  </p:childTnLst>
+                                </p:cTn>
+                              </p:par>
+                            </p:childTnLst>
+                          </p:cTn>
+                        </p:par>
+                      </p:childTnLst>
+                    </p:cTn>
+                  </p:par>
+                  <p:par>
+                    <p:cTn id="9" fill="hold">
+                      <p:stCondLst>
+                        <p:cond delay="indefinite"/>
+                      </p:stCondLst>
+                      <p:childTnLst>
+                        <p:par>
+                          <p:cTn id="10" fill="hold">
+                            <p:stCondLst>
+                              <p:cond delay="0"/>
+                            </p:stCondLst>
+                            <p:childTnLst>
+                              <p:par>
+                                <p:cTn id="11" presetID="2" presetClass="entr" presetSubtype="4" fill="hold" nodeType="clickEffect">
+                                  <p:stCondLst>
+                                    <p:cond delay="0"/>
+                                  </p:stCondLst>
+                                  <p:childTnLst>
+                                    <p:set>
+                                      <p:cBhvr>
+                                        <p:cTn id="12" dur="1" fill="hold">
+                                          <p:stCondLst>
+                                            <p:cond delay="0"/>
+                                          </p:stCondLst>
+                                        </p:cTn>
+                                        <p:tgtEl>
+                                          <p:spTgt spid="2"/>
+                                        </p:tgtEl>
+                                        <p:attrNameLst>
+                                          <p:attrName>style.visibility</p:attrName>
+                                        </p:attrNameLst>
+                                      </p:cBhvr>
+                                      <p:to>
+                                        <p:strVal val="visible"/>
+                                      </p:to>
+                                    </p:set>
+                                    <p:anim calcmode="lin" valueType="num">
+                                      <p:cBhvr additive="base">
+                                        <p:cTn id="13" dur="500" fill="hold"/>
+                                        <p:tgtEl>
+                                          <p:spTgt spid="2"/>
+                                        </p:tgtEl>
+                                        <p:attrNameLst>
+                                          <p:attrName>ppt_x</p:attrName>
+                                        </p:attrNameLst>
+                                      </p:cBhvr>
+                                      <p:tavLst>
+                                        <p:tav tm="0">
+                                          <p:val>
+                                            <p:strVal val="#ppt_x"/>
+                                          </p:val>
+                                        </p:tav>
+                                        <p:tav tm="100000">
+                                          <p:val>
+                                            <p:strVal val="#ppt_x"/>
+                                          </p:val>
+                                        </p:tav>
+                                      </p:tavLst>
+                                    </p:anim>
+                                    <p:anim calcmode="lin" valueType="num">
+                                      <p:cBhvr additive="base">
+                                        <p:cTn id="14" dur="500" fill="hold"/>
+                                        <p:tgtEl>
+                                          <p:spTgt spid="2"/>
+                                        </p:tgtEl>
+                                        <p:attrNameLst>
+                                          <p:attrName>ppt_y</p:attrName>
+                                        </p:attrNameLst>
+                                      </p:cBhvr>
+                                      <p:tavLst>
+                                        <p:tav tm="0">
+                                          <p:val>
+                                            <p:strVal val="1+#ppt_h/2"/>
+                                          </p:val>
+                                        </p:tav>
+                                        <p:tav tm="100000">
+                                          <p:val>
+                                            <p:strVal val="#ppt_y"/>
+                                          </p:val>
+                                        </p:tav>
+                                      </p:tavLst>
+                                    </p:anim>
+                                  </p:childTnLst>
+                                </p:cTn>
+                              </p:par>
+                            </p:childTnLst>
+                          </p:cTn>
+                        </p:par>
+                      </p:childTnLst>
+                    </p:cTn>
+                  </p:par>
+                </p:childTnLst>
+              </p:cTn>
+              <p:prevCondLst>
+                <p:cond evt="onPrev" delay="0">
+                  <p:tgtEl>
+                    <p:sldTgt/>
+                  </p:tgtEl>
+                </p:cond>
+              </p:prevCondLst>
+              <p:nextCondLst>
+                <p:cond evt="onNext" delay="0">
+                  <p:tgtEl>
+                    <p:sldTgt/>
+                  </p:tgtEl>
+                </p:cond>
+              </p:nextCondLst>
+            </p:seq>
+          </p:childTnLst>
+        </p:cTn>
       </p:par>
     </p:tnLst>
   </p:timing>
@@ -4976,7 +5850,212 @@
   <p:timing>
     <p:tnLst>
       <p:par>
-        <p:cTn id="1" dur="indefinite" restart="never" nodeType="tmRoot"/>
+        <p:cTn id="1" dur="indefinite" restart="never" nodeType="tmRoot">
+          <p:childTnLst>
+            <p:seq concurrent="1" nextAc="seek">
+              <p:cTn id="2" dur="indefinite" nodeType="mainSeq">
+                <p:childTnLst>
+                  <p:par>
+                    <p:cTn id="3" fill="hold">
+                      <p:stCondLst>
+                        <p:cond delay="indefinite"/>
+                      </p:stCondLst>
+                      <p:childTnLst>
+                        <p:par>
+                          <p:cTn id="4" fill="hold">
+                            <p:stCondLst>
+                              <p:cond delay="0"/>
+                            </p:stCondLst>
+                            <p:childTnLst>
+                              <p:par>
+                                <p:cTn id="5" presetID="2" presetClass="entr" presetSubtype="4" fill="hold" nodeType="clickEffect">
+                                  <p:stCondLst>
+                                    <p:cond delay="0"/>
+                                  </p:stCondLst>
+                                  <p:childTnLst>
+                                    <p:set>
+                                      <p:cBhvr>
+                                        <p:cTn id="6" dur="1" fill="hold">
+                                          <p:stCondLst>
+                                            <p:cond delay="0"/>
+                                          </p:stCondLst>
+                                        </p:cTn>
+                                        <p:tgtEl>
+                                          <p:spTgt spid="2"/>
+                                        </p:tgtEl>
+                                        <p:attrNameLst>
+                                          <p:attrName>style.visibility</p:attrName>
+                                        </p:attrNameLst>
+                                      </p:cBhvr>
+                                      <p:to>
+                                        <p:strVal val="visible"/>
+                                      </p:to>
+                                    </p:set>
+                                    <p:anim calcmode="lin" valueType="num">
+                                      <p:cBhvr additive="base">
+                                        <p:cTn id="7" dur="500" fill="hold"/>
+                                        <p:tgtEl>
+                                          <p:spTgt spid="2"/>
+                                        </p:tgtEl>
+                                        <p:attrNameLst>
+                                          <p:attrName>ppt_x</p:attrName>
+                                        </p:attrNameLst>
+                                      </p:cBhvr>
+                                      <p:tavLst>
+                                        <p:tav tm="0">
+                                          <p:val>
+                                            <p:strVal val="#ppt_x"/>
+                                          </p:val>
+                                        </p:tav>
+                                        <p:tav tm="100000">
+                                          <p:val>
+                                            <p:strVal val="#ppt_x"/>
+                                          </p:val>
+                                        </p:tav>
+                                      </p:tavLst>
+                                    </p:anim>
+                                    <p:anim calcmode="lin" valueType="num">
+                                      <p:cBhvr additive="base">
+                                        <p:cTn id="8" dur="500" fill="hold"/>
+                                        <p:tgtEl>
+                                          <p:spTgt spid="2"/>
+                                        </p:tgtEl>
+                                        <p:attrNameLst>
+                                          <p:attrName>ppt_y</p:attrName>
+                                        </p:attrNameLst>
+                                      </p:cBhvr>
+                                      <p:tavLst>
+                                        <p:tav tm="0">
+                                          <p:val>
+                                            <p:strVal val="1+#ppt_h/2"/>
+                                          </p:val>
+                                        </p:tav>
+                                        <p:tav tm="100000">
+                                          <p:val>
+                                            <p:strVal val="#ppt_y"/>
+                                          </p:val>
+                                        </p:tav>
+                                      </p:tavLst>
+                                    </p:anim>
+                                  </p:childTnLst>
+                                </p:cTn>
+                              </p:par>
+                            </p:childTnLst>
+                          </p:cTn>
+                        </p:par>
+                      </p:childTnLst>
+                    </p:cTn>
+                  </p:par>
+                  <p:par>
+                    <p:cTn id="9" fill="hold">
+                      <p:stCondLst>
+                        <p:cond delay="indefinite"/>
+                      </p:stCondLst>
+                      <p:childTnLst>
+                        <p:par>
+                          <p:cTn id="10" fill="hold">
+                            <p:stCondLst>
+                              <p:cond delay="0"/>
+                            </p:stCondLst>
+                            <p:childTnLst>
+                              <p:par>
+                                <p:cTn id="11" presetID="2" presetClass="entr" presetSubtype="4" fill="hold" nodeType="clickEffect">
+                                  <p:stCondLst>
+                                    <p:cond delay="0"/>
+                                  </p:stCondLst>
+                                  <p:childTnLst>
+                                    <p:set>
+                                      <p:cBhvr>
+                                        <p:cTn id="12" dur="1" fill="hold">
+                                          <p:stCondLst>
+                                            <p:cond delay="0"/>
+                                          </p:stCondLst>
+                                        </p:cTn>
+                                        <p:tgtEl>
+                                          <p:spTgt spid="3"/>
+                                        </p:tgtEl>
+                                        <p:attrNameLst>
+                                          <p:attrName>style.visibility</p:attrName>
+                                        </p:attrNameLst>
+                                      </p:cBhvr>
+                                      <p:to>
+                                        <p:strVal val="visible"/>
+                                      </p:to>
+                                    </p:set>
+                                    <p:anim calcmode="lin" valueType="num">
+                                      <p:cBhvr additive="base">
+                                        <p:cTn id="13" dur="500" fill="hold"/>
+                                        <p:tgtEl>
+                                          <p:spTgt spid="3"/>
+                                        </p:tgtEl>
+                                        <p:attrNameLst>
+                                          <p:attrName>ppt_x</p:attrName>
+                                        </p:attrNameLst>
+                                      </p:cBhvr>
+                                      <p:tavLst>
+                                        <p:tav tm="0">
+                                          <p:val>
+                                            <p:strVal val="#ppt_x"/>
+                                          </p:val>
+                                        </p:tav>
+                                        <p:tav tm="100000">
+                                          <p:val>
+                                            <p:strVal val="#ppt_x"/>
+                                          </p:val>
+                                        </p:tav>
+                                      </p:tavLst>
+                                    </p:anim>
+                                    <p:anim calcmode="lin" valueType="num">
+                                      <p:cBhvr additive="base">
+                                        <p:cTn id="14" dur="500" fill="hold"/>
+                                        <p:tgtEl>
+                                          <p:spTgt spid="3"/>
+                                        </p:tgtEl>
+                                        <p:attrNameLst>
+                                          <p:attrName>ppt_y</p:attrName>
+                                        </p:attrNameLst>
+                                      </p:cBhvr>
+                                      <p:tavLst>
+                                        <p:tav tm="0">
+                                          <p:val>
+                                            <p:strVal val="1+#ppt_h/2"/>
+                                          </p:val>
+                                        </p:tav>
+                                        <p:tav tm="100000">
+                                          <p:val>
+                                            <p:strVal val="#ppt_y"/>
+                                          </p:val>
+                                        </p:tav>
+                                      </p:tavLst>
+                                    </p:anim>
+                                  </p:childTnLst>
+                                </p:cTn>
+                              </p:par>
+                            </p:childTnLst>
+                          </p:cTn>
+                        </p:par>
+                      </p:childTnLst>
+                    </p:cTn>
+                  </p:par>
+                </p:childTnLst>
+              </p:cTn>
+              <p:prevCondLst>
+                <p:cond evt="onPrev" delay="0">
+                  <p:tgtEl>
+                    <p:sldTgt/>
+                  </p:tgtEl>
+                </p:cond>
+              </p:prevCondLst>
+              <p:nextCondLst>
+                <p:cond evt="onNext" delay="0">
+                  <p:tgtEl>
+                    <p:sldTgt/>
+                  </p:tgtEl>
+                </p:cond>
+              </p:nextCondLst>
+            </p:seq>
+          </p:childTnLst>
+        </p:cTn>
       </p:par>
     </p:tnLst>
   </p:timing>
@@ -5085,7 +6164,212 @@
   <p:timing>
     <p:tnLst>
       <p:par>
-        <p:cTn id="1" dur="indefinite" restart="never" nodeType="tmRoot"/>
+        <p:cTn id="1" dur="indefinite" restart="never" nodeType="tmRoot">
+          <p:childTnLst>
+            <p:seq concurrent="1" nextAc="seek">
+              <p:cTn id="2" dur="indefinite" nodeType="mainSeq">
+                <p:childTnLst>
+                  <p:par>
+                    <p:cTn id="3" fill="hold">
+                      <p:stCondLst>
+                        <p:cond delay="indefinite"/>
+                      </p:stCondLst>
+                      <p:childTnLst>
+                        <p:par>
+                          <p:cTn id="4" fill="hold">
+                            <p:stCondLst>
+                              <p:cond delay="0"/>
+                            </p:stCondLst>
+                            <p:childTnLst>
+                              <p:par>
+                                <p:cTn id="5" presetID="2" presetClass="entr" presetSubtype="4" fill="hold" nodeType="clickEffect">
+                                  <p:stCondLst>
+                                    <p:cond delay="0"/>
+                                  </p:stCondLst>
+                                  <p:childTnLst>
+                                    <p:set>
+                                      <p:cBhvr>
+                                        <p:cTn id="6" dur="1" fill="hold">
+                                          <p:stCondLst>
+                                            <p:cond delay="0"/>
+                                          </p:stCondLst>
+                                        </p:cTn>
+                                        <p:tgtEl>
+                                          <p:spTgt spid="2"/>
+                                        </p:tgtEl>
+                                        <p:attrNameLst>
+                                          <p:attrName>style.visibility</p:attrName>
+                                        </p:attrNameLst>
+                                      </p:cBhvr>
+                                      <p:to>
+                                        <p:strVal val="visible"/>
+                                      </p:to>
+                                    </p:set>
+                                    <p:anim calcmode="lin" valueType="num">
+                                      <p:cBhvr additive="base">
+                                        <p:cTn id="7" dur="500" fill="hold"/>
+                                        <p:tgtEl>
+                                          <p:spTgt spid="2"/>
+                                        </p:tgtEl>
+                                        <p:attrNameLst>
+                                          <p:attrName>ppt_x</p:attrName>
+                                        </p:attrNameLst>
+                                      </p:cBhvr>
+                                      <p:tavLst>
+                                        <p:tav tm="0">
+                                          <p:val>
+                                            <p:strVal val="#ppt_x"/>
+                                          </p:val>
+                                        </p:tav>
+                                        <p:tav tm="100000">
+                                          <p:val>
+                                            <p:strVal val="#ppt_x"/>
+                                          </p:val>
+                                        </p:tav>
+                                      </p:tavLst>
+                                    </p:anim>
+                                    <p:anim calcmode="lin" valueType="num">
+                                      <p:cBhvr additive="base">
+                                        <p:cTn id="8" dur="500" fill="hold"/>
+                                        <p:tgtEl>
+                                          <p:spTgt spid="2"/>
+                                        </p:tgtEl>
+                                        <p:attrNameLst>
+                                          <p:attrName>ppt_y</p:attrName>
+                                        </p:attrNameLst>
+                                      </p:cBhvr>
+                                      <p:tavLst>
+                                        <p:tav tm="0">
+                                          <p:val>
+                                            <p:strVal val="1+#ppt_h/2"/>
+                                          </p:val>
+                                        </p:tav>
+                                        <p:tav tm="100000">
+                                          <p:val>
+                                            <p:strVal val="#ppt_y"/>
+                                          </p:val>
+                                        </p:tav>
+                                      </p:tavLst>
+                                    </p:anim>
+                                  </p:childTnLst>
+                                </p:cTn>
+                              </p:par>
+                            </p:childTnLst>
+                          </p:cTn>
+                        </p:par>
+                      </p:childTnLst>
+                    </p:cTn>
+                  </p:par>
+                  <p:par>
+                    <p:cTn id="9" fill="hold">
+                      <p:stCondLst>
+                        <p:cond delay="indefinite"/>
+                      </p:stCondLst>
+                      <p:childTnLst>
+                        <p:par>
+                          <p:cTn id="10" fill="hold">
+                            <p:stCondLst>
+                              <p:cond delay="0"/>
+                            </p:stCondLst>
+                            <p:childTnLst>
+                              <p:par>
+                                <p:cTn id="11" presetID="2" presetClass="entr" presetSubtype="4" fill="hold" nodeType="clickEffect">
+                                  <p:stCondLst>
+                                    <p:cond delay="0"/>
+                                  </p:stCondLst>
+                                  <p:childTnLst>
+                                    <p:set>
+                                      <p:cBhvr>
+                                        <p:cTn id="12" dur="1" fill="hold">
+                                          <p:stCondLst>
+                                            <p:cond delay="0"/>
+                                          </p:stCondLst>
+                                        </p:cTn>
+                                        <p:tgtEl>
+                                          <p:spTgt spid="3"/>
+                                        </p:tgtEl>
+                                        <p:attrNameLst>
+                                          <p:attrName>style.visibility</p:attrName>
+                                        </p:attrNameLst>
+                                      </p:cBhvr>
+                                      <p:to>
+                                        <p:strVal val="visible"/>
+                                      </p:to>
+                                    </p:set>
+                                    <p:anim calcmode="lin" valueType="num">
+                                      <p:cBhvr additive="base">
+                                        <p:cTn id="13" dur="500" fill="hold"/>
+                                        <p:tgtEl>
+                                          <p:spTgt spid="3"/>
+                                        </p:tgtEl>
+                                        <p:attrNameLst>
+                                          <p:attrName>ppt_x</p:attrName>
+                                        </p:attrNameLst>
+                                      </p:cBhvr>
+                                      <p:tavLst>
+                                        <p:tav tm="0">
+                                          <p:val>
+                                            <p:strVal val="#ppt_x"/>
+                                          </p:val>
+                                        </p:tav>
+                                        <p:tav tm="100000">
+                                          <p:val>
+                                            <p:strVal val="#ppt_x"/>
+                                          </p:val>
+                                        </p:tav>
+                                      </p:tavLst>
+                                    </p:anim>
+                                    <p:anim calcmode="lin" valueType="num">
+                                      <p:cBhvr additive="base">
+                                        <p:cTn id="14" dur="500" fill="hold"/>
+                                        <p:tgtEl>
+                                          <p:spTgt spid="3"/>
+                                        </p:tgtEl>
+                                        <p:attrNameLst>
+                                          <p:attrName>ppt_y</p:attrName>
+                                        </p:attrNameLst>
+                                      </p:cBhvr>
+                                      <p:tavLst>
+                                        <p:tav tm="0">
+                                          <p:val>
+                                            <p:strVal val="1+#ppt_h/2"/>
+                                          </p:val>
+                                        </p:tav>
+                                        <p:tav tm="100000">
+                                          <p:val>
+                                            <p:strVal val="#ppt_y"/>
+                                          </p:val>
+                                        </p:tav>
+                                      </p:tavLst>
+                                    </p:anim>
+                                  </p:childTnLst>
+                                </p:cTn>
+                              </p:par>
+                            </p:childTnLst>
+                          </p:cTn>
+                        </p:par>
+                      </p:childTnLst>
+                    </p:cTn>
+                  </p:par>
+                </p:childTnLst>
+              </p:cTn>
+              <p:prevCondLst>
+                <p:cond evt="onPrev" delay="0">
+                  <p:tgtEl>
+                    <p:sldTgt/>
+                  </p:tgtEl>
+                </p:cond>
+              </p:prevCondLst>
+              <p:nextCondLst>
+                <p:cond evt="onNext" delay="0">
+                  <p:tgtEl>
+                    <p:sldTgt/>
+                  </p:tgtEl>
+                </p:cond>
+              </p:nextCondLst>
+            </p:seq>
+          </p:childTnLst>
+        </p:cTn>
       </p:par>
     </p:tnLst>
   </p:timing>
@@ -5454,7 +6738,83 @@
   <p:timing>
     <p:tnLst>
       <p:par>
-        <p:cTn id="1" dur="indefinite" restart="never" nodeType="tmRoot"/>
+        <p:cTn id="1" dur="indefinite" restart="never" nodeType="tmRoot">
+          <p:childTnLst>
+            <p:seq concurrent="1" nextAc="seek">
+              <p:cTn id="2" dur="indefinite" nodeType="mainSeq">
+                <p:childTnLst>
+                  <p:par>
+                    <p:cTn id="3" fill="hold">
+                      <p:stCondLst>
+                        <p:cond delay="indefinite"/>
+                      </p:stCondLst>
+                      <p:childTnLst>
+                        <p:par>
+                          <p:cTn id="4" fill="hold">
+                            <p:stCondLst>
+                              <p:cond delay="0"/>
+                            </p:stCondLst>
+                            <p:childTnLst>
+                              <p:par>
+                                <p:cTn id="5" presetID="16" presetClass="entr" presetSubtype="21" fill="hold" nodeType="clickEffect">
+                                  <p:stCondLst>
+                                    <p:cond delay="0"/>
+                                  </p:stCondLst>
+                                  <p:childTnLst>
+                                    <p:set>
+                                      <p:cBhvr>
+                                        <p:cTn id="6" dur="1" fill="hold">
+                                          <p:stCondLst>
+                                            <p:cond delay="0"/>
+                                          </p:stCondLst>
+                                        </p:cTn>
+                                        <p:tgtEl>
+                                          <p:spTgt spid="2050"/>
+                                        </p:tgtEl>
+                                        <p:attrNameLst>
+                                          <p:attrName>style.visibility</p:attrName>
+                                        </p:attrNameLst>
+                                      </p:cBhvr>
+                                      <p:to>
+                                        <p:strVal val="visible"/>
+                                      </p:to>
+                                    </p:set>
+                                    <p:animEffect transition="in" filter="barn(inVertical)">
+                                      <p:cBhvr>
+                                        <p:cTn id="7" dur="500"/>
+                                        <p:tgtEl>
+                                          <p:spTgt spid="2050"/>
+                                        </p:tgtEl>
+                                      </p:cBhvr>
+                                    </p:animEffect>
+                                  </p:childTnLst>
+                                </p:cTn>
+                              </p:par>
+                            </p:childTnLst>
+                          </p:cTn>
+                        </p:par>
+                      </p:childTnLst>
+                    </p:cTn>
+                  </p:par>
+                </p:childTnLst>
+              </p:cTn>
+              <p:prevCondLst>
+                <p:cond evt="onPrev" delay="0">
+                  <p:tgtEl>
+                    <p:sldTgt/>
+                  </p:tgtEl>
+                </p:cond>
+              </p:prevCondLst>
+              <p:nextCondLst>
+                <p:cond evt="onNext" delay="0">
+                  <p:tgtEl>
+                    <p:sldTgt/>
+                  </p:tgtEl>
+                </p:cond>
+              </p:nextCondLst>
+            </p:seq>
+          </p:childTnLst>
+        </p:cTn>
       </p:par>
     </p:tnLst>
   </p:timing>
@@ -5760,21 +7120,26 @@
                 <a:latin typeface="Bell MT" panose="02020503060305020303" pitchFamily="18" charset="0"/>
                 <a:cs typeface="David" panose="020B0604020202020204" pitchFamily="34" charset="-79"/>
               </a:rPr>
-              <a:t>Implementation steps</a:t>
-            </a:r>
-          </a:p>
-          <a:p>
-            <a:pPr marL="514350" indent="-514350">
-              <a:buFont typeface="+mj-lt"/>
-              <a:buAutoNum type="arabicPeriod"/>
-            </a:pPr>
-            <a:r>
-              <a:rPr lang="en-IN" sz="1600" b="1" dirty="0">
+              <a:t>Implementation </a:t>
+            </a:r>
+            <a:r>
+              <a:rPr lang="en-IN" sz="1800" b="1" dirty="0" smtClean="0">
+                <a:latin typeface="Bell MT" panose="02020503060305020303" pitchFamily="18" charset="0"/>
+                <a:cs typeface="David" panose="020B0604020202020204" pitchFamily="34" charset="-79"/>
+              </a:rPr>
+              <a:t>steps</a:t>
+            </a:r>
+            <a:r>
+              <a:rPr lang="en-IN" sz="1600" b="1" dirty="0" smtClean="0">
                 <a:latin typeface="Bell MT" panose="02020503060305020303" pitchFamily="18" charset="0"/>
                 <a:cs typeface="David" panose="020B0604020202020204" pitchFamily="34" charset="-79"/>
               </a:rPr>
               <a:t> </a:t>
             </a:r>
+            <a:endParaRPr lang="en-IN" sz="1600" b="1" dirty="0">
+              <a:latin typeface="Bell MT" panose="02020503060305020303" pitchFamily="18" charset="0"/>
+              <a:cs typeface="David" panose="020B0604020202020204" pitchFamily="34" charset="-79"/>
+            </a:endParaRPr>
           </a:p>
           <a:p>
             <a:pPr marL="514350" indent="-514350">
@@ -6070,7 +7435,66 @@
   <p:timing>
     <p:tnLst>
       <p:par>
-        <p:cTn id="1" dur="indefinite" restart="never" nodeType="tmRoot"/>
+        <p:cTn id="1" dur="indefinite" restart="never" nodeType="tmRoot">
+          <p:childTnLst>
+            <p:seq concurrent="1" nextAc="seek">
+              <p:cTn id="2" dur="indefinite" nodeType="mainSeq">
+                <p:childTnLst>
+                  <p:par>
+                    <p:cTn id="3" fill="hold">
+                      <p:stCondLst>
+                        <p:cond delay="indefinite"/>
+                      </p:stCondLst>
+                      <p:childTnLst>
+                        <p:par>
+                          <p:cTn id="4" fill="hold">
+                            <p:stCondLst>
+                              <p:cond delay="0"/>
+                            </p:stCondLst>
+                            <p:childTnLst>
+                              <p:par>
+                                <p:cTn id="5" presetID="6" presetClass="emph" presetSubtype="0" fill="hold" nodeType="clickEffect">
+                                  <p:stCondLst>
+                                    <p:cond delay="0"/>
+                                  </p:stCondLst>
+                                  <p:childTnLst>
+                                    <p:animScale>
+                                      <p:cBhvr>
+                                        <p:cTn id="6" dur="2000" fill="hold"/>
+                                        <p:tgtEl>
+                                          <p:spTgt spid="3074"/>
+                                        </p:tgtEl>
+                                      </p:cBhvr>
+                                      <p:by x="150000" y="150000"/>
+                                    </p:animScale>
+                                  </p:childTnLst>
+                                </p:cTn>
+                              </p:par>
+                            </p:childTnLst>
+                          </p:cTn>
+                        </p:par>
+                      </p:childTnLst>
+                    </p:cTn>
+                  </p:par>
+                </p:childTnLst>
+              </p:cTn>
+              <p:prevCondLst>
+                <p:cond evt="onPrev" delay="0">
+                  <p:tgtEl>
+                    <p:sldTgt/>
+                  </p:tgtEl>
+                </p:cond>
+              </p:prevCondLst>
+              <p:nextCondLst>
+                <p:cond evt="onNext" delay="0">
+                  <p:tgtEl>
+                    <p:sldTgt/>
+                  </p:tgtEl>
+                </p:cond>
+              </p:nextCondLst>
+            </p:seq>
+          </p:childTnLst>
+        </p:cTn>
       </p:par>
     </p:tnLst>
   </p:timing>
@@ -6467,7 +7891,295 @@
   <p:timing>
     <p:tnLst>
       <p:par>
-        <p:cTn id="1" dur="indefinite" restart="never" nodeType="tmRoot"/>
+        <p:cTn id="1" dur="indefinite" restart="never" nodeType="tmRoot">
+          <p:childTnLst>
+            <p:seq concurrent="1" nextAc="seek">
+              <p:cTn id="2" dur="indefinite" nodeType="mainSeq">
+                <p:childTnLst>
+                  <p:par>
+                    <p:cTn id="3" fill="hold">
+                      <p:stCondLst>
+                        <p:cond delay="indefinite"/>
+                      </p:stCondLst>
+                      <p:childTnLst>
+                        <p:par>
+                          <p:cTn id="4" fill="hold">
+                            <p:stCondLst>
+                              <p:cond delay="0"/>
+                            </p:stCondLst>
+                            <p:childTnLst>
+                              <p:par>
+                                <p:cTn id="5" presetID="22" presetClass="entr" presetSubtype="4" fill="hold" nodeType="clickEffect">
+                                  <p:stCondLst>
+                                    <p:cond delay="0"/>
+                                  </p:stCondLst>
+                                  <p:childTnLst>
+                                    <p:set>
+                                      <p:cBhvr>
+                                        <p:cTn id="6" dur="1" fill="hold">
+                                          <p:stCondLst>
+                                            <p:cond delay="0"/>
+                                          </p:stCondLst>
+                                        </p:cTn>
+                                        <p:tgtEl>
+                                          <p:spTgt spid="4100"/>
+                                        </p:tgtEl>
+                                        <p:attrNameLst>
+                                          <p:attrName>style.visibility</p:attrName>
+                                        </p:attrNameLst>
+                                      </p:cBhvr>
+                                      <p:to>
+                                        <p:strVal val="visible"/>
+                                      </p:to>
+                                    </p:set>
+                                    <p:animEffect transition="in" filter="wipe(down)">
+                                      <p:cBhvr>
+                                        <p:cTn id="7" dur="500"/>
+                                        <p:tgtEl>
+                                          <p:spTgt spid="4100"/>
+                                        </p:tgtEl>
+                                      </p:cBhvr>
+                                    </p:animEffect>
+                                  </p:childTnLst>
+                                </p:cTn>
+                              </p:par>
+                            </p:childTnLst>
+                          </p:cTn>
+                        </p:par>
+                      </p:childTnLst>
+                    </p:cTn>
+                  </p:par>
+                  <p:par>
+                    <p:cTn id="8" fill="hold">
+                      <p:stCondLst>
+                        <p:cond delay="indefinite"/>
+                      </p:stCondLst>
+                      <p:childTnLst>
+                        <p:par>
+                          <p:cTn id="9" fill="hold">
+                            <p:stCondLst>
+                              <p:cond delay="0"/>
+                            </p:stCondLst>
+                            <p:childTnLst>
+                              <p:par>
+                                <p:cTn id="10" presetID="22" presetClass="entr" presetSubtype="4" fill="hold" nodeType="clickEffect">
+                                  <p:stCondLst>
+                                    <p:cond delay="0"/>
+                                  </p:stCondLst>
+                                  <p:childTnLst>
+                                    <p:set>
+                                      <p:cBhvr>
+                                        <p:cTn id="11" dur="1" fill="hold">
+                                          <p:stCondLst>
+                                            <p:cond delay="0"/>
+                                          </p:stCondLst>
+                                        </p:cTn>
+                                        <p:tgtEl>
+                                          <p:spTgt spid="4106"/>
+                                        </p:tgtEl>
+                                        <p:attrNameLst>
+                                          <p:attrName>style.visibility</p:attrName>
+                                        </p:attrNameLst>
+                                      </p:cBhvr>
+                                      <p:to>
+                                        <p:strVal val="visible"/>
+                                      </p:to>
+                                    </p:set>
+                                    <p:animEffect transition="in" filter="wipe(down)">
+                                      <p:cBhvr>
+                                        <p:cTn id="12" dur="500"/>
+                                        <p:tgtEl>
+                                          <p:spTgt spid="4106"/>
+                                        </p:tgtEl>
+                                      </p:cBhvr>
+                                    </p:animEffect>
+                                  </p:childTnLst>
+                                </p:cTn>
+                              </p:par>
+                            </p:childTnLst>
+                          </p:cTn>
+                        </p:par>
+                      </p:childTnLst>
+                    </p:cTn>
+                  </p:par>
+                  <p:par>
+                    <p:cTn id="13" fill="hold">
+                      <p:stCondLst>
+                        <p:cond delay="indefinite"/>
+                      </p:stCondLst>
+                      <p:childTnLst>
+                        <p:par>
+                          <p:cTn id="14" fill="hold">
+                            <p:stCondLst>
+                              <p:cond delay="0"/>
+                            </p:stCondLst>
+                            <p:childTnLst>
+                              <p:par>
+                                <p:cTn id="15" presetID="22" presetClass="entr" presetSubtype="4" fill="hold" nodeType="clickEffect">
+                                  <p:stCondLst>
+                                    <p:cond delay="0"/>
+                                  </p:stCondLst>
+                                  <p:childTnLst>
+                                    <p:set>
+                                      <p:cBhvr>
+                                        <p:cTn id="16" dur="1" fill="hold">
+                                          <p:stCondLst>
+                                            <p:cond delay="0"/>
+                                          </p:stCondLst>
+                                        </p:cTn>
+                                        <p:tgtEl>
+                                          <p:spTgt spid="4112"/>
+                                        </p:tgtEl>
+                                        <p:attrNameLst>
+                                          <p:attrName>style.visibility</p:attrName>
+                                        </p:attrNameLst>
+                                      </p:cBhvr>
+                                      <p:to>
+                                        <p:strVal val="visible"/>
+                                      </p:to>
+                                    </p:set>
+                                    <p:animEffect transition="in" filter="wipe(down)">
+                                      <p:cBhvr>
+                                        <p:cTn id="17" dur="500"/>
+                                        <p:tgtEl>
+                                          <p:spTgt spid="4112"/>
+                                        </p:tgtEl>
+                                      </p:cBhvr>
+                                    </p:animEffect>
+                                  </p:childTnLst>
+                                </p:cTn>
+                              </p:par>
+                            </p:childTnLst>
+                          </p:cTn>
+                        </p:par>
+                      </p:childTnLst>
+                    </p:cTn>
+                  </p:par>
+                  <p:par>
+                    <p:cTn id="18" fill="hold">
+                      <p:stCondLst>
+                        <p:cond delay="indefinite"/>
+                      </p:stCondLst>
+                      <p:childTnLst>
+                        <p:par>
+                          <p:cTn id="19" fill="hold">
+                            <p:stCondLst>
+                              <p:cond delay="0"/>
+                            </p:stCondLst>
+                            <p:childTnLst>
+                              <p:par>
+                                <p:cTn id="20" presetID="22" presetClass="entr" presetSubtype="4" fill="hold" nodeType="clickEffect">
+                                  <p:stCondLst>
+                                    <p:cond delay="0"/>
+                                  </p:stCondLst>
+                                  <p:childTnLst>
+                                    <p:set>
+                                      <p:cBhvr>
+                                        <p:cTn id="21" dur="1" fill="hold">
+                                          <p:stCondLst>
+                                            <p:cond delay="0"/>
+                                          </p:stCondLst>
+                                        </p:cTn>
+                                        <p:tgtEl>
+                                          <p:spTgt spid="4114"/>
+                                        </p:tgtEl>
+                                        <p:attrNameLst>
+                                          <p:attrName>style.visibility</p:attrName>
+                                        </p:attrNameLst>
+                                      </p:cBhvr>
+                                      <p:to>
+                                        <p:strVal val="visible"/>
+                                      </p:to>
+                                    </p:set>
+                                    <p:animEffect transition="in" filter="wipe(down)">
+                                      <p:cBhvr>
+                                        <p:cTn id="22" dur="500"/>
+                                        <p:tgtEl>
+                                          <p:spTgt spid="4114"/>
+                                        </p:tgtEl>
+                                      </p:cBhvr>
+                                    </p:animEffect>
+                                  </p:childTnLst>
+                                </p:cTn>
+                              </p:par>
+                            </p:childTnLst>
+                          </p:cTn>
+                        </p:par>
+                      </p:childTnLst>
+                    </p:cTn>
+                  </p:par>
+                  <p:par>
+                    <p:cTn id="23" fill="hold">
+                      <p:stCondLst>
+                        <p:cond delay="indefinite"/>
+                      </p:stCondLst>
+                      <p:childTnLst>
+                        <p:par>
+                          <p:cTn id="24" fill="hold">
+                            <p:stCondLst>
+                              <p:cond delay="0"/>
+                            </p:stCondLst>
+                            <p:childTnLst>
+                              <p:par>
+                                <p:cTn id="25" presetID="22" presetClass="entr" presetSubtype="4" fill="hold" nodeType="clickEffect">
+                                  <p:stCondLst>
+                                    <p:cond delay="0"/>
+                                  </p:stCondLst>
+                                  <p:childTnLst>
+                                    <p:set>
+                                      <p:cBhvr>
+                                        <p:cTn id="26" dur="1" fill="hold">
+                                          <p:stCondLst>
+                                            <p:cond delay="0"/>
+                                          </p:stCondLst>
+                                        </p:cTn>
+                                        <p:tgtEl>
+                                          <p:spTgt spid="4110"/>
+                                        </p:tgtEl>
+                                        <p:attrNameLst>
+                                          <p:attrName>style.visibility</p:attrName>
+                                        </p:attrNameLst>
+                                      </p:cBhvr>
+                                      <p:to>
+                                        <p:strVal val="visible"/>
+                                      </p:to>
+                                    </p:set>
+                                    <p:animEffect transition="in" filter="wipe(down)">
+                                      <p:cBhvr>
+                                        <p:cTn id="27" dur="500"/>
+                                        <p:tgtEl>
+                                          <p:spTgt spid="4110"/>
+                                        </p:tgtEl>
+                                      </p:cBhvr>
+                                    </p:animEffect>
+                                  </p:childTnLst>
+                                </p:cTn>
+                              </p:par>
+                            </p:childTnLst>
+                          </p:cTn>
+                        </p:par>
+                      </p:childTnLst>
+                    </p:cTn>
+                  </p:par>
+                </p:childTnLst>
+              </p:cTn>
+              <p:prevCondLst>
+                <p:cond evt="onPrev" delay="0">
+                  <p:tgtEl>
+                    <p:sldTgt/>
+                  </p:tgtEl>
+                </p:cond>
+              </p:prevCondLst>
+              <p:nextCondLst>
+                <p:cond evt="onNext" delay="0">
+                  <p:tgtEl>
+                    <p:sldTgt/>
+                  </p:tgtEl>
+                </p:cond>
+              </p:nextCondLst>
+            </p:seq>
+          </p:childTnLst>
+        </p:cTn>
       </p:par>
     </p:tnLst>
   </p:timing>
@@ -7040,11 +8752,7 @@
             <a:pPr marL="342900" indent="-342900"/>
             <a:r>
               <a:rPr lang="en-US" sz="2600" dirty="0" smtClean="0"/>
-              <a:t>Next step </a:t>
-            </a:r>
-            <a:r>
-              <a:rPr lang="en-US" sz="2600" dirty="0" smtClean="0"/>
-              <a:t>would be pre-processing of data.</a:t>
+              <a:t>Next step would be pre-processing of data.</a:t>
             </a:r>
             <a:endParaRPr lang="en-US" sz="2600" dirty="0"/>
           </a:p>
@@ -7583,7 +9291,129 @@
   <p:timing>
     <p:tnLst>
       <p:par>
-        <p:cTn id="1" dur="indefinite" restart="never" nodeType="tmRoot"/>
+        <p:cTn id="1" dur="indefinite" restart="never" nodeType="tmRoot">
+          <p:childTnLst>
+            <p:seq concurrent="1" nextAc="seek">
+              <p:cTn id="2" dur="indefinite" nodeType="mainSeq">
+                <p:childTnLst>
+                  <p:par>
+                    <p:cTn id="3" fill="hold">
+                      <p:stCondLst>
+                        <p:cond delay="indefinite"/>
+                      </p:stCondLst>
+                      <p:childTnLst>
+                        <p:par>
+                          <p:cTn id="4" fill="hold">
+                            <p:stCondLst>
+                              <p:cond delay="0"/>
+                            </p:stCondLst>
+                            <p:childTnLst>
+                              <p:par>
+                                <p:cTn id="5" presetID="42" presetClass="entr" presetSubtype="0" fill="hold" nodeType="clickEffect">
+                                  <p:stCondLst>
+                                    <p:cond delay="0"/>
+                                  </p:stCondLst>
+                                  <p:childTnLst>
+                                    <p:set>
+                                      <p:cBhvr>
+                                        <p:cTn id="6" dur="1" fill="hold">
+                                          <p:stCondLst>
+                                            <p:cond delay="0"/>
+                                          </p:stCondLst>
+                                        </p:cTn>
+                                        <p:tgtEl>
+                                          <p:spTgt spid="1026"/>
+                                        </p:tgtEl>
+                                        <p:attrNameLst>
+                                          <p:attrName>style.visibility</p:attrName>
+                                        </p:attrNameLst>
+                                      </p:cBhvr>
+                                      <p:to>
+                                        <p:strVal val="visible"/>
+                                      </p:to>
+                                    </p:set>
+                                    <p:animEffect transition="in" filter="fade">
+                                      <p:cBhvr>
+                                        <p:cTn id="7" dur="1000"/>
+                                        <p:tgtEl>
+                                          <p:spTgt spid="1026"/>
+                                        </p:tgtEl>
+                                      </p:cBhvr>
+                                    </p:animEffect>
+                                    <p:anim calcmode="lin" valueType="num">
+                                      <p:cBhvr>
+                                        <p:cTn id="8" dur="1000" fill="hold"/>
+                                        <p:tgtEl>
+                                          <p:spTgt spid="1026"/>
+                                        </p:tgtEl>
+                                        <p:attrNameLst>
+                                          <p:attrName>ppt_x</p:attrName>
+                                        </p:attrNameLst>
+                                      </p:cBhvr>
+                                      <p:tavLst>
+                                        <p:tav tm="0">
+                                          <p:val>
+                                            <p:strVal val="#ppt_x"/>
+                                          </p:val>
+                                        </p:tav>
+                                        <p:tav tm="100000">
+                                          <p:val>
+                                            <p:strVal val="#ppt_x"/>
+                                          </p:val>
+                                        </p:tav>
+                                      </p:tavLst>
+                                    </p:anim>
+                                    <p:anim calcmode="lin" valueType="num">
+                                      <p:cBhvr>
+                                        <p:cTn id="9" dur="1000" fill="hold"/>
+                                        <p:tgtEl>
+                                          <p:spTgt spid="1026"/>
+                                        </p:tgtEl>
+                                        <p:attrNameLst>
+                                          <p:attrName>ppt_y</p:attrName>
+                                        </p:attrNameLst>
+                                      </p:cBhvr>
+                                      <p:tavLst>
+                                        <p:tav tm="0">
+                                          <p:val>
+                                            <p:strVal val="#ppt_y+.1"/>
+                                          </p:val>
+                                        </p:tav>
+                                        <p:tav tm="100000">
+                                          <p:val>
+                                            <p:strVal val="#ppt_y"/>
+                                          </p:val>
+                                        </p:tav>
+                                      </p:tavLst>
+                                    </p:anim>
+                                  </p:childTnLst>
+                                </p:cTn>
+                              </p:par>
+                            </p:childTnLst>
+                          </p:cTn>
+                        </p:par>
+                      </p:childTnLst>
+                    </p:cTn>
+                  </p:par>
+                </p:childTnLst>
+              </p:cTn>
+              <p:prevCondLst>
+                <p:cond evt="onPrev" delay="0">
+                  <p:tgtEl>
+                    <p:sldTgt/>
+                  </p:tgtEl>
+                </p:cond>
+              </p:prevCondLst>
+              <p:nextCondLst>
+                <p:cond evt="onNext" delay="0">
+                  <p:tgtEl>
+                    <p:sldTgt/>
+                  </p:tgtEl>
+                </p:cond>
+              </p:nextCondLst>
+            </p:seq>
+          </p:childTnLst>
+        </p:cTn>
       </p:par>
     </p:tnLst>
   </p:timing>

</xml_diff>